<commit_message>
Added title and authors' names
</commit_message>
<xml_diff>
--- a/Article presentation.pptx
+++ b/Article presentation.pptx
@@ -2484,62 +2484,6 @@
       </p:grpSpPr>
       <p:sp>
         <p:nvSpPr>
-          <p:cNvPr id="2" name="Tittel 1"/>
-          <p:cNvSpPr>
-            <a:spLocks noGrp="1"/>
-          </p:cNvSpPr>
-          <p:nvPr>
-            <p:ph type="ctrTitle"/>
-          </p:nvPr>
-        </p:nvSpPr>
-        <p:spPr>
-          <a:xfrm>
-            <a:off x="1267185" y="1100410"/>
-            <a:ext cx="7772400" cy="675821"/>
-          </a:xfrm>
-        </p:spPr>
-        <p:txBody>
-          <a:bodyPr/>
-          <a:lstStyle/>
-          <a:p>
-            <a:r>
-              <a:rPr lang="nb-NO" dirty="0"/>
-              <a:t>Tittel</a:t>
-            </a:r>
-          </a:p>
-        </p:txBody>
-      </p:sp>
-      <p:sp>
-        <p:nvSpPr>
-          <p:cNvPr id="3" name="Undertittel 2"/>
-          <p:cNvSpPr>
-            <a:spLocks noGrp="1"/>
-          </p:cNvSpPr>
-          <p:nvPr>
-            <p:ph type="subTitle" idx="1"/>
-          </p:nvPr>
-        </p:nvSpPr>
-        <p:spPr>
-          <a:xfrm>
-            <a:off x="1267185" y="1744145"/>
-            <a:ext cx="7399737" cy="1314450"/>
-          </a:xfrm>
-        </p:spPr>
-        <p:txBody>
-          <a:bodyPr>
-            <a:normAutofit/>
-          </a:bodyPr>
-          <a:lstStyle/>
-          <a:p>
-            <a:r>
-              <a:rPr lang="nb-NO" dirty="0"/>
-              <a:t>Undertittel. Evt. navn/dato/årstall</a:t>
-            </a:r>
-          </a:p>
-        </p:txBody>
-      </p:sp>
-      <p:sp>
-        <p:nvSpPr>
           <p:cNvPr id="5" name="TekstSylinder 4">
             <a:extLst>
               <a:ext uri="{FF2B5EF4-FFF2-40B4-BE49-F238E27FC236}">
@@ -2606,6 +2550,277 @@
               </a:rPr>
               <a:t> Science and Technology</a:t>
             </a:r>
+          </a:p>
+        </p:txBody>
+      </p:sp>
+      <p:sp>
+        <p:nvSpPr>
+          <p:cNvPr id="6" name="Undertittel 5">
+            <a:extLst>
+              <a:ext uri="{FF2B5EF4-FFF2-40B4-BE49-F238E27FC236}">
+                <a16:creationId xmlns:a16="http://schemas.microsoft.com/office/drawing/2014/main" id="{396CC1AA-3F0C-9740-8F96-A6DA4BC5D54F}"/>
+              </a:ext>
+            </a:extLst>
+          </p:cNvPr>
+          <p:cNvSpPr>
+            <a:spLocks noGrp="1"/>
+          </p:cNvSpPr>
+          <p:nvPr>
+            <p:ph type="subTitle" idx="1"/>
+          </p:nvPr>
+        </p:nvSpPr>
+        <p:spPr/>
+        <p:txBody>
+          <a:bodyPr/>
+          <a:lstStyle/>
+          <a:p>
+            <a:endParaRPr lang="en-GB" dirty="0"/>
+          </a:p>
+        </p:txBody>
+      </p:sp>
+      <p:sp>
+        <p:nvSpPr>
+          <p:cNvPr id="7" name="Undertittel 2">
+            <a:extLst>
+              <a:ext uri="{FF2B5EF4-FFF2-40B4-BE49-F238E27FC236}">
+                <a16:creationId xmlns:a16="http://schemas.microsoft.com/office/drawing/2014/main" id="{7AA22A1F-3AFF-0349-B0A1-DECD5A146FD3}"/>
+              </a:ext>
+            </a:extLst>
+          </p:cNvPr>
+          <p:cNvSpPr txBox="1">
+            <a:spLocks/>
+          </p:cNvSpPr>
+          <p:nvPr/>
+        </p:nvSpPr>
+        <p:spPr>
+          <a:xfrm>
+            <a:off x="1267186" y="1744145"/>
+            <a:ext cx="4621292" cy="486732"/>
+          </a:xfrm>
+          <a:prstGeom prst="rect">
+            <a:avLst/>
+          </a:prstGeom>
+        </p:spPr>
+        <p:txBody>
+          <a:bodyPr vert="horz" lIns="91440" tIns="45720" rIns="91440" bIns="45720" rtlCol="0">
+            <a:normAutofit/>
+          </a:bodyPr>
+          <a:lstStyle>
+            <a:lvl1pPr marL="0" indent="0" algn="l" defTabSz="457200" rtl="0" eaLnBrk="1" latinLnBrk="0" hangingPunct="1">
+              <a:spcBef>
+                <a:spcPct val="20000"/>
+              </a:spcBef>
+              <a:buFont typeface="Arial"/>
+              <a:buNone/>
+              <a:defRPr sz="2400" kern="1200">
+                <a:solidFill>
+                  <a:schemeClr val="tx1">
+                    <a:tint val="75000"/>
+                  </a:schemeClr>
+                </a:solidFill>
+                <a:latin typeface="Arial"/>
+                <a:ea typeface="+mn-ea"/>
+                <a:cs typeface="Arial"/>
+              </a:defRPr>
+            </a:lvl1pPr>
+            <a:lvl2pPr marL="457200" indent="0" algn="ctr" defTabSz="457200" rtl="0" eaLnBrk="1" latinLnBrk="0" hangingPunct="1">
+              <a:spcBef>
+                <a:spcPct val="20000"/>
+              </a:spcBef>
+              <a:buFont typeface="Arial"/>
+              <a:buNone/>
+              <a:defRPr sz="2000" kern="1200">
+                <a:solidFill>
+                  <a:schemeClr val="tx1">
+                    <a:tint val="75000"/>
+                  </a:schemeClr>
+                </a:solidFill>
+                <a:latin typeface="Arial"/>
+                <a:ea typeface="+mn-ea"/>
+                <a:cs typeface="Arial"/>
+              </a:defRPr>
+            </a:lvl2pPr>
+            <a:lvl3pPr marL="914400" indent="0" algn="ctr" defTabSz="457200" rtl="0" eaLnBrk="1" latinLnBrk="0" hangingPunct="1">
+              <a:spcBef>
+                <a:spcPct val="20000"/>
+              </a:spcBef>
+              <a:buFont typeface="Arial"/>
+              <a:buNone/>
+              <a:defRPr sz="1800" kern="1200">
+                <a:solidFill>
+                  <a:schemeClr val="tx1">
+                    <a:tint val="75000"/>
+                  </a:schemeClr>
+                </a:solidFill>
+                <a:latin typeface="Arial"/>
+                <a:ea typeface="+mn-ea"/>
+                <a:cs typeface="Arial"/>
+              </a:defRPr>
+            </a:lvl3pPr>
+            <a:lvl4pPr marL="1371600" indent="0" algn="ctr" defTabSz="457200" rtl="0" eaLnBrk="1" latinLnBrk="0" hangingPunct="1">
+              <a:spcBef>
+                <a:spcPct val="20000"/>
+              </a:spcBef>
+              <a:buFont typeface="Arial"/>
+              <a:buNone/>
+              <a:defRPr sz="1600" kern="1200">
+                <a:solidFill>
+                  <a:schemeClr val="tx1">
+                    <a:tint val="75000"/>
+                  </a:schemeClr>
+                </a:solidFill>
+                <a:latin typeface="Arial"/>
+                <a:ea typeface="+mn-ea"/>
+                <a:cs typeface="Arial"/>
+              </a:defRPr>
+            </a:lvl4pPr>
+            <a:lvl5pPr marL="1828800" indent="0" algn="ctr" defTabSz="457200" rtl="0" eaLnBrk="1" latinLnBrk="0" hangingPunct="1">
+              <a:spcBef>
+                <a:spcPct val="20000"/>
+              </a:spcBef>
+              <a:buFont typeface="Arial"/>
+              <a:buNone/>
+              <a:defRPr sz="1400" kern="1200">
+                <a:solidFill>
+                  <a:schemeClr val="tx1">
+                    <a:tint val="75000"/>
+                  </a:schemeClr>
+                </a:solidFill>
+                <a:latin typeface="Arial"/>
+                <a:ea typeface="+mn-ea"/>
+                <a:cs typeface="Arial"/>
+              </a:defRPr>
+            </a:lvl5pPr>
+            <a:lvl6pPr marL="2286000" indent="0" algn="ctr" defTabSz="457200" rtl="0" eaLnBrk="1" latinLnBrk="0" hangingPunct="1">
+              <a:spcBef>
+                <a:spcPct val="20000"/>
+              </a:spcBef>
+              <a:buFont typeface="Arial"/>
+              <a:buNone/>
+              <a:defRPr sz="2000" kern="1200">
+                <a:solidFill>
+                  <a:schemeClr val="tx1">
+                    <a:tint val="75000"/>
+                  </a:schemeClr>
+                </a:solidFill>
+                <a:latin typeface="+mn-lt"/>
+                <a:ea typeface="+mn-ea"/>
+                <a:cs typeface="+mn-cs"/>
+              </a:defRPr>
+            </a:lvl6pPr>
+            <a:lvl7pPr marL="2743200" indent="0" algn="ctr" defTabSz="457200" rtl="0" eaLnBrk="1" latinLnBrk="0" hangingPunct="1">
+              <a:spcBef>
+                <a:spcPct val="20000"/>
+              </a:spcBef>
+              <a:buFont typeface="Arial"/>
+              <a:buNone/>
+              <a:defRPr sz="2000" kern="1200">
+                <a:solidFill>
+                  <a:schemeClr val="tx1">
+                    <a:tint val="75000"/>
+                  </a:schemeClr>
+                </a:solidFill>
+                <a:latin typeface="+mn-lt"/>
+                <a:ea typeface="+mn-ea"/>
+                <a:cs typeface="+mn-cs"/>
+              </a:defRPr>
+            </a:lvl7pPr>
+            <a:lvl8pPr marL="3200400" indent="0" algn="ctr" defTabSz="457200" rtl="0" eaLnBrk="1" latinLnBrk="0" hangingPunct="1">
+              <a:spcBef>
+                <a:spcPct val="20000"/>
+              </a:spcBef>
+              <a:buFont typeface="Arial"/>
+              <a:buNone/>
+              <a:defRPr sz="2000" kern="1200">
+                <a:solidFill>
+                  <a:schemeClr val="tx1">
+                    <a:tint val="75000"/>
+                  </a:schemeClr>
+                </a:solidFill>
+                <a:latin typeface="+mn-lt"/>
+                <a:ea typeface="+mn-ea"/>
+                <a:cs typeface="+mn-cs"/>
+              </a:defRPr>
+            </a:lvl8pPr>
+            <a:lvl9pPr marL="3657600" indent="0" algn="ctr" defTabSz="457200" rtl="0" eaLnBrk="1" latinLnBrk="0" hangingPunct="1">
+              <a:spcBef>
+                <a:spcPct val="20000"/>
+              </a:spcBef>
+              <a:buFont typeface="Arial"/>
+              <a:buNone/>
+              <a:defRPr sz="2000" kern="1200">
+                <a:solidFill>
+                  <a:schemeClr val="tx1">
+                    <a:tint val="75000"/>
+                  </a:schemeClr>
+                </a:solidFill>
+                <a:latin typeface="+mn-lt"/>
+                <a:ea typeface="+mn-ea"/>
+                <a:cs typeface="+mn-cs"/>
+              </a:defRPr>
+            </a:lvl9pPr>
+          </a:lstStyle>
+          <a:p>
+            <a:r>
+              <a:rPr lang="nb-NO" sz="1800"/>
+              <a:t>Iain Carmichael &amp; J. S. Marron</a:t>
+            </a:r>
+            <a:endParaRPr lang="nb-NO" sz="1800" dirty="0"/>
+          </a:p>
+        </p:txBody>
+      </p:sp>
+      <p:sp>
+        <p:nvSpPr>
+          <p:cNvPr id="10" name="Tittel 1">
+            <a:extLst>
+              <a:ext uri="{FF2B5EF4-FFF2-40B4-BE49-F238E27FC236}">
+                <a16:creationId xmlns:a16="http://schemas.microsoft.com/office/drawing/2014/main" id="{893A0FD7-4009-A741-A730-AB52F2BEBC6D}"/>
+              </a:ext>
+            </a:extLst>
+          </p:cNvPr>
+          <p:cNvSpPr txBox="1">
+            <a:spLocks/>
+          </p:cNvSpPr>
+          <p:nvPr/>
+        </p:nvSpPr>
+        <p:spPr>
+          <a:xfrm>
+            <a:off x="1267185" y="1100410"/>
+            <a:ext cx="7772400" cy="1754326"/>
+          </a:xfrm>
+          <a:prstGeom prst="rect">
+            <a:avLst/>
+          </a:prstGeom>
+        </p:spPr>
+        <p:txBody>
+          <a:bodyPr vert="horz" wrap="square" lIns="91440" tIns="45720" rIns="91440" bIns="45720" rtlCol="0" anchor="t" anchorCtr="0">
+            <a:spAutoFit/>
+          </a:bodyPr>
+          <a:lstStyle>
+            <a:lvl1pPr algn="l" defTabSz="457200" rtl="0" eaLnBrk="1" latinLnBrk="0" hangingPunct="1">
+              <a:spcBef>
+                <a:spcPct val="0"/>
+              </a:spcBef>
+              <a:buNone/>
+              <a:defRPr sz="3600" b="1" i="0" kern="1200">
+                <a:solidFill>
+                  <a:schemeClr val="tx1"/>
+                </a:solidFill>
+                <a:latin typeface="Arial"/>
+                <a:ea typeface="+mj-ea"/>
+                <a:cs typeface="Arial"/>
+              </a:defRPr>
+            </a:lvl1pPr>
+          </a:lstStyle>
+          <a:p>
+            <a:r>
+              <a:rPr lang="nb-NO" sz="2800"/>
+              <a:t>Data science vs. statistics: two cultures?</a:t>
+            </a:r>
+            <a:br>
+              <a:rPr lang="nb-NO" sz="4000"/>
+            </a:br>
+            <a:endParaRPr lang="nb-NO" sz="4000" dirty="0"/>
           </a:p>
         </p:txBody>
       </p:sp>

</xml_diff>